<commit_message>
Added Course Materials - Day 12
</commit_message>
<xml_diff>
--- a/2. Core Java/Day 10/Slides/8. The Big Picture/8-jquery-getting-started-m8-slides.pptx
+++ b/2. Core Java/Day 10/Slides/8. The Big Picture/8-jquery-getting-started-m8-slides.pptx
@@ -4364,6 +4364,30 @@
           </a:prstGeom>
         </p:spPr>
       </p:pic>
+      <p:pic>
+        <p:nvPicPr>
+          <p:cNvPr id="3" name="Picture 2"/>
+          <p:cNvPicPr>
+            <a:picLocks noChangeAspect="1"/>
+          </p:cNvPicPr>
+          <p:nvPr/>
+        </p:nvPicPr>
+        <p:blipFill>
+          <a:blip r:embed="rId4"/>
+          <a:stretch>
+            <a:fillRect/>
+          </a:stretch>
+        </p:blipFill>
+        <p:spPr>
+          <a:xfrm>
+            <a:off x="2438400" y="3962400"/>
+            <a:ext cx="1590675" cy="180975"/>
+          </a:xfrm>
+          <a:prstGeom prst="rect">
+            <a:avLst/>
+          </a:prstGeom>
+        </p:spPr>
+      </p:pic>
     </p:spTree>
   </p:cSld>
   <p:clrMapOvr>

</xml_diff>